<commit_message>
Added more model metrics
</commit_message>
<xml_diff>
--- a/Project.pptx
+++ b/Project.pptx
@@ -27,6 +27,7 @@
     <p:sldId id="274" r:id="rId21"/>
     <p:sldId id="275" r:id="rId22"/>
     <p:sldId id="276" r:id="rId23"/>
+    <p:sldId id="278" r:id="rId24"/>
   </p:sldIdLst>
   <p:sldSz cx="12192000" cy="6858000"/>
   <p:notesSz cx="6858000" cy="9144000"/>
@@ -125,6 +126,11 @@
       </a:defRPr>
     </a:lvl9pPr>
   </p:defaultTextStyle>
+  <p:extLst>
+    <p:ext uri="{EFAFB233-063F-42B5-8137-9DF3F51BA10A}">
+      <p15:sldGuideLst xmlns:p15="http://schemas.microsoft.com/office/powerpoint/2012/main"/>
+    </p:ext>
+  </p:extLst>
 </p:presentation>
 </file>
 
@@ -301,7 +307,7 @@
           <a:p>
             <a:fld id="{155CA4B8-D9D7-4E8A-AE00-323F97DE4173}" type="datetimeFigureOut">
               <a:rPr lang="en-US" smtClean="0"/>
-              <a:t>5/11/2020</a:t>
+              <a:t>5/12/2020</a:t>
             </a:fld>
             <a:endParaRPr lang="en-US"/>
           </a:p>
@@ -499,7 +505,7 @@
           <a:p>
             <a:fld id="{155CA4B8-D9D7-4E8A-AE00-323F97DE4173}" type="datetimeFigureOut">
               <a:rPr lang="en-US" smtClean="0"/>
-              <a:t>5/11/2020</a:t>
+              <a:t>5/12/2020</a:t>
             </a:fld>
             <a:endParaRPr lang="en-US"/>
           </a:p>
@@ -707,7 +713,7 @@
           <a:p>
             <a:fld id="{155CA4B8-D9D7-4E8A-AE00-323F97DE4173}" type="datetimeFigureOut">
               <a:rPr lang="en-US" smtClean="0"/>
-              <a:t>5/11/2020</a:t>
+              <a:t>5/12/2020</a:t>
             </a:fld>
             <a:endParaRPr lang="en-US"/>
           </a:p>
@@ -905,7 +911,7 @@
           <a:p>
             <a:fld id="{155CA4B8-D9D7-4E8A-AE00-323F97DE4173}" type="datetimeFigureOut">
               <a:rPr lang="en-US" smtClean="0"/>
-              <a:t>5/11/2020</a:t>
+              <a:t>5/12/2020</a:t>
             </a:fld>
             <a:endParaRPr lang="en-US"/>
           </a:p>
@@ -1180,7 +1186,7 @@
           <a:p>
             <a:fld id="{155CA4B8-D9D7-4E8A-AE00-323F97DE4173}" type="datetimeFigureOut">
               <a:rPr lang="en-US" smtClean="0"/>
-              <a:t>5/11/2020</a:t>
+              <a:t>5/12/2020</a:t>
             </a:fld>
             <a:endParaRPr lang="en-US"/>
           </a:p>
@@ -1445,7 +1451,7 @@
           <a:p>
             <a:fld id="{155CA4B8-D9D7-4E8A-AE00-323F97DE4173}" type="datetimeFigureOut">
               <a:rPr lang="en-US" smtClean="0"/>
-              <a:t>5/11/2020</a:t>
+              <a:t>5/12/2020</a:t>
             </a:fld>
             <a:endParaRPr lang="en-US"/>
           </a:p>
@@ -1857,7 +1863,7 @@
           <a:p>
             <a:fld id="{155CA4B8-D9D7-4E8A-AE00-323F97DE4173}" type="datetimeFigureOut">
               <a:rPr lang="en-US" smtClean="0"/>
-              <a:t>5/11/2020</a:t>
+              <a:t>5/12/2020</a:t>
             </a:fld>
             <a:endParaRPr lang="en-US"/>
           </a:p>
@@ -1998,7 +2004,7 @@
           <a:p>
             <a:fld id="{155CA4B8-D9D7-4E8A-AE00-323F97DE4173}" type="datetimeFigureOut">
               <a:rPr lang="en-US" smtClean="0"/>
-              <a:t>5/11/2020</a:t>
+              <a:t>5/12/2020</a:t>
             </a:fld>
             <a:endParaRPr lang="en-US"/>
           </a:p>
@@ -2111,7 +2117,7 @@
           <a:p>
             <a:fld id="{155CA4B8-D9D7-4E8A-AE00-323F97DE4173}" type="datetimeFigureOut">
               <a:rPr lang="en-US" smtClean="0"/>
-              <a:t>5/11/2020</a:t>
+              <a:t>5/12/2020</a:t>
             </a:fld>
             <a:endParaRPr lang="en-US"/>
           </a:p>
@@ -2422,7 +2428,7 @@
           <a:p>
             <a:fld id="{155CA4B8-D9D7-4E8A-AE00-323F97DE4173}" type="datetimeFigureOut">
               <a:rPr lang="en-US" smtClean="0"/>
-              <a:t>5/11/2020</a:t>
+              <a:t>5/12/2020</a:t>
             </a:fld>
             <a:endParaRPr lang="en-US"/>
           </a:p>
@@ -2710,7 +2716,7 @@
           <a:p>
             <a:fld id="{155CA4B8-D9D7-4E8A-AE00-323F97DE4173}" type="datetimeFigureOut">
               <a:rPr lang="en-US" smtClean="0"/>
-              <a:t>5/11/2020</a:t>
+              <a:t>5/12/2020</a:t>
             </a:fld>
             <a:endParaRPr lang="en-US"/>
           </a:p>
@@ -2951,7 +2957,7 @@
           <a:p>
             <a:fld id="{155CA4B8-D9D7-4E8A-AE00-323F97DE4173}" type="datetimeFigureOut">
               <a:rPr lang="en-US" smtClean="0"/>
-              <a:t>5/11/2020</a:t>
+              <a:t>5/12/2020</a:t>
             </a:fld>
             <a:endParaRPr lang="en-US"/>
           </a:p>
@@ -6413,6 +6419,175 @@
     <p:extLst>
       <p:ext uri="{BB962C8B-B14F-4D97-AF65-F5344CB8AC3E}">
         <p14:creationId xmlns:p14="http://schemas.microsoft.com/office/powerpoint/2010/main" val="1732741554"/>
+      </p:ext>
+    </p:extLst>
+  </p:cSld>
+  <p:clrMapOvr>
+    <a:masterClrMapping/>
+  </p:clrMapOvr>
+</p:sld>
+</file>
+
+<file path=ppt/slides/slide23.xml><?xml version="1.0" encoding="utf-8"?>
+<p:sld xmlns:a="http://schemas.openxmlformats.org/drawingml/2006/main" xmlns:r="http://schemas.openxmlformats.org/officeDocument/2006/relationships" xmlns:p="http://schemas.openxmlformats.org/presentationml/2006/main">
+  <p:cSld>
+    <p:spTree>
+      <p:nvGrpSpPr>
+        <p:cNvPr id="1" name=""/>
+        <p:cNvGrpSpPr/>
+        <p:nvPr/>
+      </p:nvGrpSpPr>
+      <p:grpSpPr>
+        <a:xfrm>
+          <a:off x="0" y="0"/>
+          <a:ext cx="0" cy="0"/>
+          <a:chOff x="0" y="0"/>
+          <a:chExt cx="0" cy="0"/>
+        </a:xfrm>
+      </p:grpSpPr>
+      <p:sp>
+        <p:nvSpPr>
+          <p:cNvPr id="2" name="Title 1">
+            <a:extLst>
+              <a:ext uri="{FF2B5EF4-FFF2-40B4-BE49-F238E27FC236}">
+                <a16:creationId xmlns:a16="http://schemas.microsoft.com/office/drawing/2014/main" id="{BD576450-283F-4A70-9AA1-626F64A66ABE}"/>
+              </a:ext>
+            </a:extLst>
+          </p:cNvPr>
+          <p:cNvSpPr>
+            <a:spLocks noGrp="1"/>
+          </p:cNvSpPr>
+          <p:nvPr>
+            <p:ph type="title"/>
+          </p:nvPr>
+        </p:nvSpPr>
+        <p:spPr/>
+        <p:txBody>
+          <a:bodyPr/>
+          <a:lstStyle/>
+          <a:p>
+            <a:r>
+              <a:rPr lang="en-US" b="1" dirty="0"/>
+              <a:t>Modeling</a:t>
+            </a:r>
+            <a:endParaRPr lang="en-US" dirty="0"/>
+          </a:p>
+        </p:txBody>
+      </p:sp>
+      <p:sp>
+        <p:nvSpPr>
+          <p:cNvPr id="3" name="Content Placeholder 2">
+            <a:extLst>
+              <a:ext uri="{FF2B5EF4-FFF2-40B4-BE49-F238E27FC236}">
+                <a16:creationId xmlns:a16="http://schemas.microsoft.com/office/drawing/2014/main" id="{DD4F3464-20CF-4FAF-AC3C-1E9473DBFA5C}"/>
+              </a:ext>
+            </a:extLst>
+          </p:cNvPr>
+          <p:cNvSpPr>
+            <a:spLocks noGrp="1"/>
+          </p:cNvSpPr>
+          <p:nvPr>
+            <p:ph idx="1"/>
+          </p:nvPr>
+        </p:nvSpPr>
+        <p:spPr>
+          <a:xfrm>
+            <a:off x="838200" y="1477108"/>
+            <a:ext cx="10515600" cy="4699855"/>
+          </a:xfrm>
+        </p:spPr>
+        <p:txBody>
+          <a:bodyPr>
+            <a:normAutofit/>
+          </a:bodyPr>
+          <a:lstStyle/>
+          <a:p>
+            <a:endParaRPr lang="en-US" dirty="0"/>
+          </a:p>
+          <a:p>
+            <a:endParaRPr lang="en-US" dirty="0"/>
+          </a:p>
+          <a:p>
+            <a:r>
+              <a:rPr lang="en-US" dirty="0"/>
+              <a:t>Independent: </a:t>
+            </a:r>
+            <a:r>
+              <a:rPr lang="en-US" dirty="0" err="1"/>
+              <a:t>Tweets_per_day</a:t>
+            </a:r>
+            <a:r>
+              <a:rPr lang="en-US" dirty="0"/>
+              <a:t> {double}, </a:t>
+            </a:r>
+            <a:r>
+              <a:rPr lang="en-US" dirty="0" err="1"/>
+              <a:t>retweet_count</a:t>
+            </a:r>
+            <a:r>
+              <a:rPr lang="en-US" dirty="0"/>
+              <a:t> {int}, </a:t>
+            </a:r>
+            <a:r>
+              <a:rPr lang="en-US" dirty="0" err="1"/>
+              <a:t>followers_count</a:t>
+            </a:r>
+            <a:r>
+              <a:rPr lang="en-US" dirty="0"/>
+              <a:t> {int},  </a:t>
+            </a:r>
+            <a:r>
+              <a:rPr lang="en-US" dirty="0" err="1"/>
+              <a:t>friends_count</a:t>
+            </a:r>
+            <a:r>
+              <a:rPr lang="en-US" dirty="0"/>
+              <a:t> {int}, </a:t>
+            </a:r>
+            <a:r>
+              <a:rPr lang="en-US" dirty="0" err="1"/>
+              <a:t>listed_count</a:t>
+            </a:r>
+            <a:r>
+              <a:rPr lang="en-US" dirty="0"/>
+              <a:t> {int}  </a:t>
+            </a:r>
+          </a:p>
+          <a:p>
+            <a:r>
+              <a:rPr lang="en-US" dirty="0"/>
+              <a:t>Dependent: Political {</a:t>
+            </a:r>
+            <a:r>
+              <a:rPr lang="en-US" dirty="0" err="1"/>
+              <a:t>boolean</a:t>
+            </a:r>
+            <a:r>
+              <a:rPr lang="en-US" dirty="0"/>
+              <a:t>} </a:t>
+            </a:r>
+          </a:p>
+          <a:p>
+            <a:endParaRPr lang="en-US" dirty="0"/>
+          </a:p>
+          <a:p>
+            <a:pPr algn="just"/>
+            <a:endParaRPr lang="en-US" dirty="0"/>
+          </a:p>
+          <a:p>
+            <a:pPr algn="just"/>
+            <a:endParaRPr lang="en-US" dirty="0"/>
+          </a:p>
+          <a:p>
+            <a:pPr algn="just"/>
+            <a:endParaRPr lang="en-US" dirty="0"/>
+          </a:p>
+        </p:txBody>
+      </p:sp>
+    </p:spTree>
+    <p:extLst>
+      <p:ext uri="{BB962C8B-B14F-4D97-AF65-F5344CB8AC3E}">
+        <p14:creationId xmlns:p14="http://schemas.microsoft.com/office/powerpoint/2010/main" val="3316920080"/>
       </p:ext>
     </p:extLst>
   </p:cSld>

</xml_diff>